<commit_message>
update the presentation file
</commit_message>
<xml_diff>
--- a/Documents/BDM-3035.pptx
+++ b/Documents/BDM-3035.pptx
@@ -18,9 +18,9 @@
     <p:sldId id="267" r:id="rId9"/>
     <p:sldId id="269" r:id="rId10"/>
     <p:sldId id="270" r:id="rId11"/>
-    <p:sldId id="268" r:id="rId12"/>
-    <p:sldId id="281" r:id="rId13"/>
-    <p:sldId id="282" r:id="rId14"/>
+    <p:sldId id="281" r:id="rId12"/>
+    <p:sldId id="282" r:id="rId13"/>
+    <p:sldId id="268" r:id="rId14"/>
     <p:sldId id="272" r:id="rId15"/>
     <p:sldId id="273" r:id="rId16"/>
     <p:sldId id="274" r:id="rId17"/>
@@ -494,6 +494,7 @@
     </c:legend>
     <c:plotVisOnly val="1"/>
     <c:dispBlanksAs val="gap"/>
+    <c:showDLblsOverMax val="0"/>
     <c:extLst>
       <c:ext xmlns:c16r3="http://schemas.microsoft.com/office/drawing/2017/03/chart" uri="{56B9EC1D-385E-4148-901F-78D8002777C0}">
         <c16r3:dataDisplayOptions16>
@@ -501,7 +502,6 @@
         </c16r3:dataDisplayOptions16>
       </c:ext>
     </c:extLst>
-    <c:showDLblsOverMax val="0"/>
   </c:chart>
   <c:spPr>
     <a:solidFill>
@@ -1172,7 +1172,7 @@
           <a:p>
             <a:fld id="{AF869721-F543-4A6C-BF9D-65D7CC540427}" type="datetimeFigureOut">
               <a:rPr lang="en-US" smtClean="0"/>
-              <a:t>8/12/2024</a:t>
+              <a:t>8/13/2024</a:t>
             </a:fld>
             <a:endParaRPr lang="en-US" dirty="0"/>
           </a:p>
@@ -1349,7 +1349,7 @@
           <a:p>
             <a:fld id="{C732326A-4C88-4AFB-AA5B-5919D81DFF5B}" type="datetimeFigureOut">
               <a:rPr lang="en-US" smtClean="0"/>
-              <a:t>8/12/2024</a:t>
+              <a:t>8/13/2024</a:t>
             </a:fld>
             <a:endParaRPr lang="en-US" dirty="0"/>
           </a:p>
@@ -2698,7 +2698,7 @@
     </p:spTree>
     <p:extLst>
       <p:ext uri="{BB962C8B-B14F-4D97-AF65-F5344CB8AC3E}">
-        <p14:creationId xmlns:p14="http://schemas.microsoft.com/office/powerpoint/2010/main" val="2230892122"/>
+        <p14:creationId xmlns:p14="http://schemas.microsoft.com/office/powerpoint/2010/main" val="3894042866"/>
       </p:ext>
     </p:extLst>
   </p:cSld>
@@ -2782,7 +2782,7 @@
     </p:spTree>
     <p:extLst>
       <p:ext uri="{BB962C8B-B14F-4D97-AF65-F5344CB8AC3E}">
-        <p14:creationId xmlns:p14="http://schemas.microsoft.com/office/powerpoint/2010/main" val="3894042866"/>
+        <p14:creationId xmlns:p14="http://schemas.microsoft.com/office/powerpoint/2010/main" val="3659975290"/>
       </p:ext>
     </p:extLst>
   </p:cSld>
@@ -2866,7 +2866,7 @@
     </p:spTree>
     <p:extLst>
       <p:ext uri="{BB962C8B-B14F-4D97-AF65-F5344CB8AC3E}">
-        <p14:creationId xmlns:p14="http://schemas.microsoft.com/office/powerpoint/2010/main" val="3659975290"/>
+        <p14:creationId xmlns:p14="http://schemas.microsoft.com/office/powerpoint/2010/main" val="2230892122"/>
       </p:ext>
     </p:extLst>
   </p:cSld>
@@ -3206,7 +3206,7 @@
             <a:fld id="{B61BEF0D-F0BB-DE4B-95CE-6DB70DBA9567}" type="datetimeFigureOut">
               <a:rPr lang="en-US" smtClean="0"/>
               <a:pPr/>
-              <a:t>8/12/2024</a:t>
+              <a:t>8/13/2024</a:t>
             </a:fld>
             <a:endParaRPr lang="en-US" dirty="0"/>
           </a:p>
@@ -3470,7 +3470,7 @@
             <a:fld id="{B61BEF0D-F0BB-DE4B-95CE-6DB70DBA9567}" type="datetimeFigureOut">
               <a:rPr lang="en-US" smtClean="0"/>
               <a:pPr/>
-              <a:t>8/12/2024</a:t>
+              <a:t>8/13/2024</a:t>
             </a:fld>
             <a:endParaRPr lang="en-US" dirty="0"/>
           </a:p>
@@ -3707,7 +3707,7 @@
             <a:fld id="{B61BEF0D-F0BB-DE4B-95CE-6DB70DBA9567}" type="datetimeFigureOut">
               <a:rPr lang="en-US" smtClean="0"/>
               <a:pPr/>
-              <a:t>8/12/2024</a:t>
+              <a:t>8/13/2024</a:t>
             </a:fld>
             <a:endParaRPr lang="en-US" dirty="0"/>
           </a:p>
@@ -3949,7 +3949,7 @@
             <a:fld id="{B61BEF0D-F0BB-DE4B-95CE-6DB70DBA9567}" type="datetimeFigureOut">
               <a:rPr lang="en-US" smtClean="0"/>
               <a:pPr/>
-              <a:t>8/12/2024</a:t>
+              <a:t>8/13/2024</a:t>
             </a:fld>
             <a:endParaRPr lang="en-US" dirty="0"/>
           </a:p>
@@ -4258,7 +4258,7 @@
             <a:fld id="{B61BEF0D-F0BB-DE4B-95CE-6DB70DBA9567}" type="datetimeFigureOut">
               <a:rPr lang="en-US" smtClean="0"/>
               <a:pPr/>
-              <a:t>8/12/2024</a:t>
+              <a:t>8/13/2024</a:t>
             </a:fld>
             <a:endParaRPr lang="en-US" dirty="0"/>
           </a:p>
@@ -4562,7 +4562,7 @@
             <a:fld id="{B61BEF0D-F0BB-DE4B-95CE-6DB70DBA9567}" type="datetimeFigureOut">
               <a:rPr lang="en-US" smtClean="0"/>
               <a:pPr/>
-              <a:t>8/12/2024</a:t>
+              <a:t>8/13/2024</a:t>
             </a:fld>
             <a:endParaRPr lang="en-US" dirty="0"/>
           </a:p>
@@ -4986,7 +4986,7 @@
             <a:fld id="{B61BEF0D-F0BB-DE4B-95CE-6DB70DBA9567}" type="datetimeFigureOut">
               <a:rPr lang="en-US" smtClean="0"/>
               <a:pPr/>
-              <a:t>8/12/2024</a:t>
+              <a:t>8/13/2024</a:t>
             </a:fld>
             <a:endParaRPr lang="en-US" dirty="0"/>
           </a:p>
@@ -5083,7 +5083,7 @@
             <a:fld id="{B61BEF0D-F0BB-DE4B-95CE-6DB70DBA9567}" type="datetimeFigureOut">
               <a:rPr lang="en-US" smtClean="0"/>
               <a:pPr/>
-              <a:t>8/12/2024</a:t>
+              <a:t>8/13/2024</a:t>
             </a:fld>
             <a:endParaRPr lang="en-US" dirty="0"/>
           </a:p>
@@ -5247,7 +5247,7 @@
             <a:fld id="{B61BEF0D-F0BB-DE4B-95CE-6DB70DBA9567}" type="datetimeFigureOut">
               <a:rPr lang="en-US" smtClean="0"/>
               <a:pPr/>
-              <a:t>8/12/2024</a:t>
+              <a:t>8/13/2024</a:t>
             </a:fld>
             <a:endParaRPr lang="en-US" dirty="0"/>
           </a:p>
@@ -5627,7 +5627,7 @@
             <a:fld id="{B61BEF0D-F0BB-DE4B-95CE-6DB70DBA9567}" type="datetimeFigureOut">
               <a:rPr lang="en-US" smtClean="0"/>
               <a:pPr/>
-              <a:t>8/12/2024</a:t>
+              <a:t>8/13/2024</a:t>
             </a:fld>
             <a:endParaRPr lang="en-US" dirty="0"/>
           </a:p>
@@ -5918,7 +5918,7 @@
             <a:fld id="{B61BEF0D-F0BB-DE4B-95CE-6DB70DBA9567}" type="datetimeFigureOut">
               <a:rPr lang="en-US" smtClean="0"/>
               <a:pPr/>
-              <a:t>8/12/2024</a:t>
+              <a:t>8/13/2024</a:t>
             </a:fld>
             <a:endParaRPr lang="en-US" dirty="0"/>
           </a:p>
@@ -6131,7 +6131,7 @@
             <a:fld id="{B61BEF0D-F0BB-DE4B-95CE-6DB70DBA9567}" type="datetimeFigureOut">
               <a:rPr lang="en-US" smtClean="0"/>
               <a:pPr/>
-              <a:t>8/12/2024</a:t>
+              <a:t>8/13/2024</a:t>
             </a:fld>
             <a:endParaRPr lang="en-US" dirty="0"/>
           </a:p>
@@ -6749,7 +6749,7 @@
                 <a16:creationId xmlns:a16="http://schemas.microsoft.com/office/drawing/2014/main" id="{493D4EDA-58E0-40CC-B3CA-14CDEB349D24}"/>
               </a:ext>
               <a:ext uri="{C183D7F6-B498-43B3-948B-1728B52AA6E4}">
-                <adec:decorative xmlns:adec="http://schemas.microsoft.com/office/drawing/2017/decorative" val="1"/>
+                <adec:decorative xmlns:adec="http://schemas.microsoft.com/office/drawing/2017/decorative" xmlns="" val="1"/>
               </a:ext>
             </a:extLst>
           </p:cNvPr>
@@ -6844,7 +6844,7 @@
                 <a16:creationId xmlns:a16="http://schemas.microsoft.com/office/drawing/2014/main" id="{AA9EB0BC-A85E-4C26-B355-5DFCEF6CCB49}"/>
               </a:ext>
               <a:ext uri="{C183D7F6-B498-43B3-948B-1728B52AA6E4}">
-                <adec:decorative xmlns:adec="http://schemas.microsoft.com/office/drawing/2017/decorative" val="1"/>
+                <adec:decorative xmlns:adec="http://schemas.microsoft.com/office/drawing/2017/decorative" xmlns="" val="1"/>
               </a:ext>
             </a:extLst>
           </p:cNvPr>
@@ -6875,7 +6875,7 @@
                   <a16:creationId xmlns:a16="http://schemas.microsoft.com/office/drawing/2014/main" id="{3643E56B-BD42-413D-B17D-7958270F5DE4}"/>
                 </a:ext>
                 <a:ext uri="{C183D7F6-B498-43B3-948B-1728B52AA6E4}">
-                  <adec:decorative xmlns:adec="http://schemas.microsoft.com/office/drawing/2017/decorative" val="1"/>
+                  <adec:decorative xmlns:adec="http://schemas.microsoft.com/office/drawing/2017/decorative" xmlns="" val="1"/>
                 </a:ext>
               </a:extLst>
             </p:cNvPr>
@@ -6934,7 +6934,7 @@
                   <a16:creationId xmlns:a16="http://schemas.microsoft.com/office/drawing/2014/main" id="{96C04F74-9467-4FA5-95DC-8D481A29740E}"/>
                 </a:ext>
                 <a:ext uri="{C183D7F6-B498-43B3-948B-1728B52AA6E4}">
-                  <adec:decorative xmlns:adec="http://schemas.microsoft.com/office/drawing/2017/decorative" val="1"/>
+                  <adec:decorative xmlns:adec="http://schemas.microsoft.com/office/drawing/2017/decorative" xmlns="" val="1"/>
                 </a:ext>
               </a:extLst>
             </p:cNvPr>
@@ -6993,7 +6993,7 @@
                   <a16:creationId xmlns:a16="http://schemas.microsoft.com/office/drawing/2014/main" id="{D73DE1C3-5C37-42E9-A3F0-256F1938327C}"/>
                 </a:ext>
                 <a:ext uri="{C183D7F6-B498-43B3-948B-1728B52AA6E4}">
-                  <adec:decorative xmlns:adec="http://schemas.microsoft.com/office/drawing/2017/decorative" val="1"/>
+                  <adec:decorative xmlns:adec="http://schemas.microsoft.com/office/drawing/2017/decorative" xmlns="" val="1"/>
                 </a:ext>
               </a:extLst>
             </p:cNvPr>
@@ -7053,7 +7053,7 @@
                 <a16:creationId xmlns:a16="http://schemas.microsoft.com/office/drawing/2014/main" id="{4A2E7EC3-E07C-46CE-9B25-41865A50681C}"/>
               </a:ext>
               <a:ext uri="{C183D7F6-B498-43B3-948B-1728B52AA6E4}">
-                <adec:decorative xmlns:adec="http://schemas.microsoft.com/office/drawing/2017/decorative" val="1"/>
+                <adec:decorative xmlns:adec="http://schemas.microsoft.com/office/drawing/2017/decorative" xmlns="" val="1"/>
               </a:ext>
             </a:extLst>
           </p:cNvPr>
@@ -7209,6 +7209,14 @@
 <file path=ppt/slides/slide10.xml><?xml version="1.0" encoding="utf-8"?>
 <p:sld xmlns:a="http://schemas.openxmlformats.org/drawingml/2006/main" xmlns:r="http://schemas.openxmlformats.org/officeDocument/2006/relationships" xmlns:p="http://schemas.openxmlformats.org/presentationml/2006/main">
   <p:cSld>
+    <p:bg>
+      <p:bgPr>
+        <a:solidFill>
+          <a:schemeClr val="bg1"/>
+        </a:solidFill>
+        <a:effectLst/>
+      </p:bgPr>
+    </p:bg>
     <p:spTree>
       <p:nvGrpSpPr>
         <p:cNvPr id="1" name=""/>
@@ -7275,8 +7283,8 @@
         </p:nvSpPr>
         <p:spPr>
           <a:xfrm>
-            <a:off x="243735" y="1941010"/>
-            <a:ext cx="11476317" cy="4443824"/>
+            <a:off x="581192" y="2180496"/>
+            <a:ext cx="11029615" cy="4443824"/>
           </a:xfrm>
         </p:spPr>
         <p:txBody>
@@ -7285,94 +7293,158 @@
           </a:bodyPr>
           <a:lstStyle/>
           <a:p>
-            <a:pPr lvl="1" algn="just"/>
+            <a:pPr algn="just"/>
+            <a:r>
+              <a:rPr lang="en-US" sz="2800" dirty="0">
+                <a:latin typeface="Gill Sans MT (Body)"/>
+                <a:ea typeface="Aptos" panose="020B0004020202020204" pitchFamily="34" charset="0"/>
+              </a:rPr>
+              <a:t>We created a CNN (Convolutional Neural Network), by using </a:t>
+            </a:r>
             <a:r>
               <a:rPr lang="en-US" sz="2800" dirty="0">
                 <a:latin typeface="Gill Sans MT (Body)"/>
                 <a:ea typeface="Aptos" panose="020B0004020202020204" pitchFamily="34" charset="0"/>
                 <a:sym typeface="Wingdings" panose="05000000000000000000" pitchFamily="2" charset="2"/>
               </a:rPr>
-              <a:t>VGG16</a:t>
-            </a:r>
-          </a:p>
-          <a:p>
-            <a:pPr lvl="2" algn="just">
+              <a:t>Tensorflow, Keras, GlobalMaxPooling2D, VGG16, among others</a:t>
+            </a:r>
+          </a:p>
+          <a:p>
+            <a:pPr algn="just"/>
+            <a:endParaRPr lang="en-US" sz="2800" dirty="0">
+              <a:latin typeface="Gill Sans MT (Body)"/>
+              <a:ea typeface="Aptos" panose="020B0004020202020204" pitchFamily="34" charset="0"/>
+              <a:sym typeface="Wingdings" panose="05000000000000000000" pitchFamily="2" charset="2"/>
+            </a:endParaRPr>
+          </a:p>
+          <a:p>
+            <a:pPr lvl="1" algn="just">
               <a:buFont typeface="Wingdings" panose="05000000000000000000" pitchFamily="2" charset="2"/>
               <a:buChar char="Ø"/>
             </a:pPr>
             <a:r>
-              <a:rPr lang="en-US" sz="2400" dirty="0">
+              <a:rPr lang="en-US" sz="2000" dirty="0">
                 <a:latin typeface="Gill Sans MT (Body)"/>
                 <a:ea typeface="Aptos" panose="020B0004020202020204" pitchFamily="34" charset="0"/>
                 <a:sym typeface="Wingdings" panose="05000000000000000000" pitchFamily="2" charset="2"/>
               </a:rPr>
-              <a:t>It </a:t>
-            </a:r>
-            <a:r>
-              <a:rPr lang="en-US" sz="2400" dirty="0">
-                <a:latin typeface="Gill Sans MT (Body)"/>
-              </a:rPr>
-              <a:t>is a convolutional neural network (CNN) architecture that was proposed by the Visual Geometry Group (VGG) at the University of Oxford.</a:t>
-            </a:r>
-          </a:p>
-          <a:p>
-            <a:pPr lvl="2" algn="just">
+              <a:t>Input layer shape (120,120,3)  (height, width, RGB)</a:t>
+            </a:r>
+          </a:p>
+          <a:p>
+            <a:pPr lvl="1" algn="just">
               <a:buFont typeface="Wingdings" panose="05000000000000000000" pitchFamily="2" charset="2"/>
               <a:buChar char="Ø"/>
             </a:pPr>
             <a:r>
-              <a:rPr lang="en-US" sz="2400" dirty="0">
+              <a:rPr lang="en-US" sz="2000" dirty="0">
                 <a:latin typeface="Gill Sans MT (Body)"/>
-              </a:rPr>
-              <a:t>It is one of the most well-known deep learning models for image classification.</a:t>
-            </a:r>
-          </a:p>
-          <a:p>
-            <a:pPr lvl="2" algn="just"/>
-            <a:endParaRPr lang="en-US" sz="2400" dirty="0">
-              <a:latin typeface="Gill Sans MT (Body)"/>
-              <a:sym typeface="Wingdings" panose="05000000000000000000" pitchFamily="2" charset="2"/>
-            </a:endParaRPr>
-          </a:p>
-          <a:p>
-            <a:pPr lvl="1" algn="just"/>
-            <a:r>
-              <a:rPr lang="en-US" sz="2800" dirty="0">
-                <a:latin typeface="Gill Sans MT (Body)"/>
-              </a:rPr>
-              <a:t>GlobalMaxPooling2D</a:t>
-            </a:r>
-          </a:p>
-          <a:p>
-            <a:pPr lvl="2" algn="just">
+                <a:ea typeface="Aptos" panose="020B0004020202020204" pitchFamily="34" charset="0"/>
+                <a:sym typeface="Wingdings" panose="05000000000000000000" pitchFamily="2" charset="2"/>
+              </a:rPr>
+              <a:t>VGG16 layer</a:t>
+            </a:r>
+          </a:p>
+          <a:p>
+            <a:pPr lvl="1" algn="just">
               <a:buFont typeface="Wingdings" panose="05000000000000000000" pitchFamily="2" charset="2"/>
               <a:buChar char="Ø"/>
             </a:pPr>
             <a:r>
-              <a:rPr lang="en-US" sz="2400" dirty="0">
+              <a:rPr lang="en-US" sz="2000" dirty="0">
                 <a:latin typeface="Gill Sans MT (Body)"/>
-              </a:rPr>
-              <a:t>It is a pooling operation commonly used in convolutional neural networks.</a:t>
-            </a:r>
-          </a:p>
-          <a:p>
-            <a:pPr lvl="2" algn="just">
+                <a:ea typeface="Aptos" panose="020B0004020202020204" pitchFamily="34" charset="0"/>
+                <a:sym typeface="Wingdings" panose="05000000000000000000" pitchFamily="2" charset="2"/>
+              </a:rPr>
+              <a:t>GlobalMaxPooling2D layer for Classification  2048 units</a:t>
+            </a:r>
+          </a:p>
+          <a:p>
+            <a:pPr lvl="1" algn="just">
               <a:buFont typeface="Wingdings" panose="05000000000000000000" pitchFamily="2" charset="2"/>
               <a:buChar char="Ø"/>
             </a:pPr>
             <a:r>
-              <a:rPr lang="en-US" sz="2400" dirty="0">
+              <a:rPr lang="en-US" sz="2000" dirty="0">
                 <a:latin typeface="Gill Sans MT (Body)"/>
-              </a:rPr>
-              <a:t>It reduces the spatial dimensions (height and width) of the input while retaining the most important features.</a:t>
-            </a:r>
+                <a:ea typeface="Aptos" panose="020B0004020202020204" pitchFamily="34" charset="0"/>
+                <a:sym typeface="Wingdings" panose="05000000000000000000" pitchFamily="2" charset="2"/>
+              </a:rPr>
+              <a:t>GlobalMaxPooling2D layer for Regression  2048 units</a:t>
+            </a:r>
+            <a:endParaRPr lang="en-US" sz="2000" dirty="0">
+              <a:latin typeface="Gill Sans MT (Body)"/>
+              <a:ea typeface="Aptos" panose="020B0004020202020204" pitchFamily="34" charset="0"/>
+            </a:endParaRPr>
+          </a:p>
+          <a:p>
+            <a:pPr lvl="1" algn="just">
+              <a:buFont typeface="Wingdings" panose="05000000000000000000" pitchFamily="2" charset="2"/>
+              <a:buChar char="Ø"/>
+            </a:pPr>
+            <a:r>
+              <a:rPr lang="en-US" sz="2000" dirty="0">
+                <a:latin typeface="Gill Sans MT (Body)"/>
+                <a:ea typeface="Aptos" panose="020B0004020202020204" pitchFamily="34" charset="0"/>
+              </a:rPr>
+              <a:t>Output layer for Classification </a:t>
+            </a:r>
+            <a:r>
+              <a:rPr lang="en-US" sz="2000" dirty="0">
+                <a:latin typeface="Gill Sans MT (Body)"/>
+                <a:ea typeface="Aptos" panose="020B0004020202020204" pitchFamily="34" charset="0"/>
+                <a:sym typeface="Wingdings" panose="05000000000000000000" pitchFamily="2" charset="2"/>
+              </a:rPr>
+              <a:t> </a:t>
+            </a:r>
+            <a:r>
+              <a:rPr lang="en-US" sz="2000" b="1" dirty="0">
+                <a:latin typeface="Gill Sans MT (Body)"/>
+                <a:ea typeface="Aptos" panose="020B0004020202020204" pitchFamily="34" charset="0"/>
+                <a:sym typeface="Wingdings" panose="05000000000000000000" pitchFamily="2" charset="2"/>
+              </a:rPr>
+              <a:t>Classes</a:t>
+            </a:r>
+          </a:p>
+          <a:p>
+            <a:pPr lvl="1" algn="just">
+              <a:buFont typeface="Wingdings" panose="05000000000000000000" pitchFamily="2" charset="2"/>
+              <a:buChar char="Ø"/>
+            </a:pPr>
+            <a:r>
+              <a:rPr lang="en-US" sz="2000" dirty="0">
+                <a:latin typeface="Gill Sans MT (Body)"/>
+                <a:ea typeface="Aptos" panose="020B0004020202020204" pitchFamily="34" charset="0"/>
+                <a:sym typeface="Wingdings" panose="05000000000000000000" pitchFamily="2" charset="2"/>
+              </a:rPr>
+              <a:t>Output layer for Regression  </a:t>
+            </a:r>
+            <a:r>
+              <a:rPr lang="en-US" sz="2000" b="1" dirty="0">
+                <a:latin typeface="Gill Sans MT (Body)"/>
+                <a:ea typeface="Aptos" panose="020B0004020202020204" pitchFamily="34" charset="0"/>
+                <a:sym typeface="Wingdings" panose="05000000000000000000" pitchFamily="2" charset="2"/>
+              </a:rPr>
+              <a:t>Coordinates</a:t>
+            </a:r>
+          </a:p>
+          <a:p>
+            <a:pPr lvl="1" algn="just">
+              <a:buFont typeface="Wingdings" panose="05000000000000000000" pitchFamily="2" charset="2"/>
+              <a:buChar char="Ø"/>
+            </a:pPr>
+            <a:endParaRPr lang="en-US" sz="2200" dirty="0">
+              <a:latin typeface="Gill Sans MT (Body)"/>
+              <a:ea typeface="Aptos" panose="020B0004020202020204" pitchFamily="34" charset="0"/>
+            </a:endParaRPr>
           </a:p>
         </p:txBody>
       </p:sp>
     </p:spTree>
     <p:extLst>
       <p:ext uri="{BB962C8B-B14F-4D97-AF65-F5344CB8AC3E}">
-        <p14:creationId xmlns:p14="http://schemas.microsoft.com/office/powerpoint/2010/main" val="3465300825"/>
+        <p14:creationId xmlns:p14="http://schemas.microsoft.com/office/powerpoint/2010/main" val="457384689"/>
       </p:ext>
     </p:extLst>
   </p:cSld>
@@ -7833,7 +7905,7 @@
         </p:spPr>
         <p:txBody>
           <a:bodyPr>
-            <a:normAutofit/>
+            <a:normAutofit fontScale="92500"/>
           </a:bodyPr>
           <a:lstStyle/>
           <a:p>
@@ -8187,7 +8259,7 @@
         </p:spPr>
         <p:txBody>
           <a:bodyPr>
-            <a:normAutofit lnSpcReduction="10000"/>
+            <a:normAutofit fontScale="92500"/>
           </a:bodyPr>
           <a:lstStyle/>
           <a:p>
@@ -9459,7 +9531,7 @@
                 <a16:creationId xmlns:a16="http://schemas.microsoft.com/office/drawing/2014/main" id="{379F11E2-8BA5-4C5C-AE7C-361E5EA011FF}"/>
               </a:ext>
               <a:ext uri="{C183D7F6-B498-43B3-948B-1728B52AA6E4}">
-                <adec:decorative xmlns:adec="http://schemas.microsoft.com/office/drawing/2017/decorative" val="1"/>
+                <adec:decorative xmlns:adec="http://schemas.microsoft.com/office/drawing/2017/decorative" xmlns="" val="1"/>
               </a:ext>
             </a:extLst>
           </p:cNvPr>
@@ -9519,7 +9591,7 @@
                 <a16:creationId xmlns:a16="http://schemas.microsoft.com/office/drawing/2014/main" id="{7C00E1DA-EC7C-40FC-95E3-11FDCD2E4291}"/>
               </a:ext>
               <a:ext uri="{C183D7F6-B498-43B3-948B-1728B52AA6E4}">
-                <adec:decorative xmlns:adec="http://schemas.microsoft.com/office/drawing/2017/decorative" val="1"/>
+                <adec:decorative xmlns:adec="http://schemas.microsoft.com/office/drawing/2017/decorative" xmlns="" val="1"/>
               </a:ext>
             </a:extLst>
           </p:cNvPr>
@@ -9580,7 +9652,7 @@
                 <a16:creationId xmlns:a16="http://schemas.microsoft.com/office/drawing/2014/main" id="{9A421166-2996-41A7-B094-AE5316F347DD}"/>
               </a:ext>
               <a:ext uri="{C183D7F6-B498-43B3-948B-1728B52AA6E4}">
-                <adec:decorative xmlns:adec="http://schemas.microsoft.com/office/drawing/2017/decorative" val="1"/>
+                <adec:decorative xmlns:adec="http://schemas.microsoft.com/office/drawing/2017/decorative" xmlns="" val="1"/>
               </a:ext>
             </a:extLst>
           </p:cNvPr>
@@ -9611,7 +9683,7 @@
                   <a16:creationId xmlns:a16="http://schemas.microsoft.com/office/drawing/2014/main" id="{FDBB1B92-A3EB-43E4-8FAB-D20E8ED14CEF}"/>
                 </a:ext>
                 <a:ext uri="{C183D7F6-B498-43B3-948B-1728B52AA6E4}">
-                  <adec:decorative xmlns:adec="http://schemas.microsoft.com/office/drawing/2017/decorative" val="1"/>
+                  <adec:decorative xmlns:adec="http://schemas.microsoft.com/office/drawing/2017/decorative" xmlns="" val="1"/>
                 </a:ext>
               </a:extLst>
             </p:cNvPr>
@@ -9670,7 +9742,7 @@
                   <a16:creationId xmlns:a16="http://schemas.microsoft.com/office/drawing/2014/main" id="{3F3972F4-FE7E-48EA-AAD8-9BE5750A6672}"/>
                 </a:ext>
                 <a:ext uri="{C183D7F6-B498-43B3-948B-1728B52AA6E4}">
-                  <adec:decorative xmlns:adec="http://schemas.microsoft.com/office/drawing/2017/decorative" val="1"/>
+                  <adec:decorative xmlns:adec="http://schemas.microsoft.com/office/drawing/2017/decorative" xmlns="" val="1"/>
                 </a:ext>
               </a:extLst>
             </p:cNvPr>
@@ -9729,7 +9801,7 @@
                   <a16:creationId xmlns:a16="http://schemas.microsoft.com/office/drawing/2014/main" id="{221614E5-870B-4D5E-A43B-8FF7E5323484}"/>
                 </a:ext>
                 <a:ext uri="{C183D7F6-B498-43B3-948B-1728B52AA6E4}">
-                  <adec:decorative xmlns:adec="http://schemas.microsoft.com/office/drawing/2017/decorative" val="1"/>
+                  <adec:decorative xmlns:adec="http://schemas.microsoft.com/office/drawing/2017/decorative" xmlns="" val="1"/>
                 </a:ext>
               </a:extLst>
             </p:cNvPr>
@@ -10180,7 +10252,7 @@
                 <a16:creationId xmlns:a16="http://schemas.microsoft.com/office/drawing/2014/main" id="{4AE9D071-98CF-435C-BD2B-976514544DC5}"/>
               </a:ext>
               <a:ext uri="{C183D7F6-B498-43B3-948B-1728B52AA6E4}">
-                <adec:decorative xmlns:adec="http://schemas.microsoft.com/office/drawing/2017/decorative" val="1"/>
+                <adec:decorative xmlns:adec="http://schemas.microsoft.com/office/drawing/2017/decorative" xmlns="" val="1"/>
               </a:ext>
             </a:extLst>
           </p:cNvPr>
@@ -10275,7 +10347,7 @@
                 <a16:creationId xmlns:a16="http://schemas.microsoft.com/office/drawing/2014/main" id="{D619FC33-16ED-4246-9596-BEFEB55E4CF6}"/>
               </a:ext>
               <a:ext uri="{C183D7F6-B498-43B3-948B-1728B52AA6E4}">
-                <adec:decorative xmlns:adec="http://schemas.microsoft.com/office/drawing/2017/decorative" val="1"/>
+                <adec:decorative xmlns:adec="http://schemas.microsoft.com/office/drawing/2017/decorative" xmlns="" val="1"/>
               </a:ext>
             </a:extLst>
           </p:cNvPr>
@@ -10306,7 +10378,7 @@
                   <a16:creationId xmlns:a16="http://schemas.microsoft.com/office/drawing/2014/main" id="{2EEA80E1-F99F-4009-837F-2F72F8A5D580}"/>
                 </a:ext>
                 <a:ext uri="{C183D7F6-B498-43B3-948B-1728B52AA6E4}">
-                  <adec:decorative xmlns:adec="http://schemas.microsoft.com/office/drawing/2017/decorative" val="1"/>
+                  <adec:decorative xmlns:adec="http://schemas.microsoft.com/office/drawing/2017/decorative" xmlns="" val="1"/>
                 </a:ext>
               </a:extLst>
             </p:cNvPr>
@@ -10367,7 +10439,7 @@
                   <a16:creationId xmlns:a16="http://schemas.microsoft.com/office/drawing/2014/main" id="{0230AF9A-4641-4BD8-9F95-9607CD304039}"/>
                 </a:ext>
                 <a:ext uri="{C183D7F6-B498-43B3-948B-1728B52AA6E4}">
-                  <adec:decorative xmlns:adec="http://schemas.microsoft.com/office/drawing/2017/decorative" val="1"/>
+                  <adec:decorative xmlns:adec="http://schemas.microsoft.com/office/drawing/2017/decorative" xmlns="" val="1"/>
                 </a:ext>
               </a:extLst>
             </p:cNvPr>
@@ -10426,7 +10498,7 @@
                   <a16:creationId xmlns:a16="http://schemas.microsoft.com/office/drawing/2014/main" id="{8703D4EC-9389-41B6-B88B-B6FDC8CD3330}"/>
                 </a:ext>
                 <a:ext uri="{C183D7F6-B498-43B3-948B-1728B52AA6E4}">
-                  <adec:decorative xmlns:adec="http://schemas.microsoft.com/office/drawing/2017/decorative" val="1"/>
+                  <adec:decorative xmlns:adec="http://schemas.microsoft.com/office/drawing/2017/decorative" xmlns="" val="1"/>
                 </a:ext>
               </a:extLst>
             </p:cNvPr>
@@ -11799,14 +11871,6 @@
 <file path=ppt/slides/slide8.xml><?xml version="1.0" encoding="utf-8"?>
 <p:sld xmlns:a="http://schemas.openxmlformats.org/drawingml/2006/main" xmlns:r="http://schemas.openxmlformats.org/officeDocument/2006/relationships" xmlns:p="http://schemas.openxmlformats.org/presentationml/2006/main">
   <p:cSld>
-    <p:bg>
-      <p:bgPr>
-        <a:solidFill>
-          <a:schemeClr val="bg1"/>
-        </a:solidFill>
-        <a:effectLst/>
-      </p:bgPr>
-    </p:bg>
     <p:spTree>
       <p:nvGrpSpPr>
         <p:cNvPr id="1" name=""/>
@@ -11873,7 +11937,7 @@
         </p:nvSpPr>
         <p:spPr>
           <a:xfrm>
-            <a:off x="581192" y="2180496"/>
+            <a:off x="383806" y="1628473"/>
             <a:ext cx="11029615" cy="4443824"/>
           </a:xfrm>
         </p:spPr>
@@ -11883,150 +11947,87 @@
           </a:bodyPr>
           <a:lstStyle/>
           <a:p>
-            <a:pPr algn="just"/>
-            <a:r>
-              <a:rPr lang="en-US" sz="2800" dirty="0">
-                <a:latin typeface="Gill Sans MT (Body)"/>
-                <a:ea typeface="Aptos" panose="020B0004020202020204" pitchFamily="34" charset="0"/>
-              </a:rPr>
-              <a:t>We created a CNN (Convolutional Neural Network), by using </a:t>
-            </a:r>
+            <a:pPr lvl="1" algn="just"/>
             <a:r>
               <a:rPr lang="en-US" sz="2800" dirty="0">
                 <a:latin typeface="Gill Sans MT (Body)"/>
                 <a:ea typeface="Aptos" panose="020B0004020202020204" pitchFamily="34" charset="0"/>
                 <a:sym typeface="Wingdings" panose="05000000000000000000" pitchFamily="2" charset="2"/>
               </a:rPr>
-              <a:t>Tensorflow, Keras, GlobalMaxPooling2D, VGG16, among others</a:t>
-            </a:r>
-          </a:p>
-          <a:p>
-            <a:pPr algn="just"/>
-            <a:endParaRPr lang="en-US" sz="2800" dirty="0">
-              <a:latin typeface="Gill Sans MT (Body)"/>
-              <a:ea typeface="Aptos" panose="020B0004020202020204" pitchFamily="34" charset="0"/>
-              <a:sym typeface="Wingdings" panose="05000000000000000000" pitchFamily="2" charset="2"/>
-            </a:endParaRPr>
-          </a:p>
-          <a:p>
-            <a:pPr lvl="1" algn="just">
+              <a:t>TensorFlow</a:t>
+            </a:r>
+          </a:p>
+          <a:p>
+            <a:pPr lvl="2" algn="just">
               <a:buFont typeface="Wingdings" panose="05000000000000000000" pitchFamily="2" charset="2"/>
               <a:buChar char="Ø"/>
             </a:pPr>
             <a:r>
-              <a:rPr lang="en-US" sz="2000" dirty="0">
+              <a:rPr lang="en-US" sz="2400" dirty="0">
                 <a:latin typeface="Gill Sans MT (Body)"/>
-                <a:ea typeface="Aptos" panose="020B0004020202020204" pitchFamily="34" charset="0"/>
                 <a:sym typeface="Wingdings" panose="05000000000000000000" pitchFamily="2" charset="2"/>
               </a:rPr>
-              <a:t>Input layer shape (120,120,3)  (height, width, RGB)</a:t>
-            </a:r>
-          </a:p>
-          <a:p>
-            <a:pPr lvl="1" algn="just">
+              <a:t>It </a:t>
+            </a:r>
+            <a:r>
+              <a:rPr lang="en-US" sz="2400" dirty="0">
+                <a:latin typeface="Gill Sans MT (Body)"/>
+              </a:rPr>
+              <a:t>is an open-source machine learning framework developed by Google.</a:t>
+            </a:r>
+          </a:p>
+          <a:p>
+            <a:pPr lvl="2" algn="just">
               <a:buFont typeface="Wingdings" panose="05000000000000000000" pitchFamily="2" charset="2"/>
               <a:buChar char="Ø"/>
             </a:pPr>
             <a:r>
-              <a:rPr lang="en-US" sz="2000" dirty="0">
+              <a:rPr lang="en-US" sz="2400" dirty="0">
                 <a:latin typeface="Gill Sans MT (Body)"/>
-                <a:ea typeface="Aptos" panose="020B0004020202020204" pitchFamily="34" charset="0"/>
-                <a:sym typeface="Wingdings" panose="05000000000000000000" pitchFamily="2" charset="2"/>
-              </a:rPr>
-              <a:t>VGG16 layer</a:t>
-            </a:r>
-          </a:p>
-          <a:p>
-            <a:pPr lvl="1" algn="just">
+              </a:rPr>
+              <a:t>It's widely used for building and deploying machine learning models, particularly deep learning models.</a:t>
+            </a:r>
+          </a:p>
+          <a:p>
+            <a:pPr lvl="2" algn="just">
               <a:buFont typeface="Wingdings" panose="05000000000000000000" pitchFamily="2" charset="2"/>
               <a:buChar char="Ø"/>
             </a:pPr>
-            <a:r>
-              <a:rPr lang="en-US" sz="2000" dirty="0">
+            <a:endParaRPr lang="en-US" sz="2400" dirty="0">
+              <a:latin typeface="Gill Sans MT (Body)"/>
+            </a:endParaRPr>
+          </a:p>
+          <a:p>
+            <a:pPr lvl="1" algn="just"/>
+            <a:r>
+              <a:rPr lang="en-US" sz="2800" dirty="0">
                 <a:latin typeface="Gill Sans MT (Body)"/>
-                <a:ea typeface="Aptos" panose="020B0004020202020204" pitchFamily="34" charset="0"/>
                 <a:sym typeface="Wingdings" panose="05000000000000000000" pitchFamily="2" charset="2"/>
               </a:rPr>
-              <a:t>GlobalMaxPooling2D layer for Classification  2048 units</a:t>
-            </a:r>
-          </a:p>
-          <a:p>
-            <a:pPr lvl="1" algn="just">
+              <a:t>Keras</a:t>
+            </a:r>
+          </a:p>
+          <a:p>
+            <a:pPr lvl="2" algn="just">
               <a:buFont typeface="Wingdings" panose="05000000000000000000" pitchFamily="2" charset="2"/>
               <a:buChar char="Ø"/>
             </a:pPr>
             <a:r>
-              <a:rPr lang="en-US" sz="2000" dirty="0">
+              <a:rPr lang="en-US" sz="2400" dirty="0">
                 <a:latin typeface="Gill Sans MT (Body)"/>
-                <a:ea typeface="Aptos" panose="020B0004020202020204" pitchFamily="34" charset="0"/>
                 <a:sym typeface="Wingdings" panose="05000000000000000000" pitchFamily="2" charset="2"/>
               </a:rPr>
-              <a:t>GlobalMaxPooling2D layer for Regression  2048 units</a:t>
-            </a:r>
-            <a:endParaRPr lang="en-US" sz="2000" dirty="0">
+              <a:t>It </a:t>
+            </a:r>
+            <a:r>
+              <a:rPr lang="en-US" sz="2400" dirty="0">
+                <a:latin typeface="Gill Sans MT (Body)"/>
+              </a:rPr>
+              <a:t>is a high-level neural networks API, written in Python and capable of running on top of TensorFlow.</a:t>
+            </a:r>
+            <a:endParaRPr lang="en-US" sz="2400" dirty="0">
               <a:latin typeface="Gill Sans MT (Body)"/>
-              <a:ea typeface="Aptos" panose="020B0004020202020204" pitchFamily="34" charset="0"/>
-            </a:endParaRPr>
-          </a:p>
-          <a:p>
-            <a:pPr lvl="1" algn="just">
-              <a:buFont typeface="Wingdings" panose="05000000000000000000" pitchFamily="2" charset="2"/>
-              <a:buChar char="Ø"/>
-            </a:pPr>
-            <a:r>
-              <a:rPr lang="en-US" sz="2000" dirty="0">
-                <a:latin typeface="Gill Sans MT (Body)"/>
-                <a:ea typeface="Aptos" panose="020B0004020202020204" pitchFamily="34" charset="0"/>
-              </a:rPr>
-              <a:t>Output layer for Classification </a:t>
-            </a:r>
-            <a:r>
-              <a:rPr lang="en-US" sz="2000" dirty="0">
-                <a:latin typeface="Gill Sans MT (Body)"/>
-                <a:ea typeface="Aptos" panose="020B0004020202020204" pitchFamily="34" charset="0"/>
-                <a:sym typeface="Wingdings" panose="05000000000000000000" pitchFamily="2" charset="2"/>
-              </a:rPr>
-              <a:t> </a:t>
-            </a:r>
-            <a:r>
-              <a:rPr lang="en-US" sz="2000" b="1" dirty="0">
-                <a:latin typeface="Gill Sans MT (Body)"/>
-                <a:ea typeface="Aptos" panose="020B0004020202020204" pitchFamily="34" charset="0"/>
-                <a:sym typeface="Wingdings" panose="05000000000000000000" pitchFamily="2" charset="2"/>
-              </a:rPr>
-              <a:t>Classes</a:t>
-            </a:r>
-          </a:p>
-          <a:p>
-            <a:pPr lvl="1" algn="just">
-              <a:buFont typeface="Wingdings" panose="05000000000000000000" pitchFamily="2" charset="2"/>
-              <a:buChar char="Ø"/>
-            </a:pPr>
-            <a:r>
-              <a:rPr lang="en-US" sz="2000" dirty="0">
-                <a:latin typeface="Gill Sans MT (Body)"/>
-                <a:ea typeface="Aptos" panose="020B0004020202020204" pitchFamily="34" charset="0"/>
-                <a:sym typeface="Wingdings" panose="05000000000000000000" pitchFamily="2" charset="2"/>
-              </a:rPr>
-              <a:t>Output layer for Regression  </a:t>
-            </a:r>
-            <a:r>
-              <a:rPr lang="en-US" sz="2000" b="1" dirty="0">
-                <a:latin typeface="Gill Sans MT (Body)"/>
-                <a:ea typeface="Aptos" panose="020B0004020202020204" pitchFamily="34" charset="0"/>
-                <a:sym typeface="Wingdings" panose="05000000000000000000" pitchFamily="2" charset="2"/>
-              </a:rPr>
-              <a:t>Coordinates</a:t>
-            </a:r>
-          </a:p>
-          <a:p>
-            <a:pPr lvl="1" algn="just">
-              <a:buFont typeface="Wingdings" panose="05000000000000000000" pitchFamily="2" charset="2"/>
-              <a:buChar char="Ø"/>
-            </a:pPr>
-            <a:endParaRPr lang="en-US" sz="2200" dirty="0">
-              <a:latin typeface="Gill Sans MT (Body)"/>
-              <a:ea typeface="Aptos" panose="020B0004020202020204" pitchFamily="34" charset="0"/>
+              <a:sym typeface="Wingdings" panose="05000000000000000000" pitchFamily="2" charset="2"/>
             </a:endParaRPr>
           </a:p>
         </p:txBody>
@@ -12034,7 +12035,7 @@
     </p:spTree>
     <p:extLst>
       <p:ext uri="{BB962C8B-B14F-4D97-AF65-F5344CB8AC3E}">
-        <p14:creationId xmlns:p14="http://schemas.microsoft.com/office/powerpoint/2010/main" val="457384689"/>
+        <p14:creationId xmlns:p14="http://schemas.microsoft.com/office/powerpoint/2010/main" val="3918595332"/>
       </p:ext>
     </p:extLst>
   </p:cSld>
@@ -12113,13 +12114,13 @@
         </p:nvSpPr>
         <p:spPr>
           <a:xfrm>
-            <a:off x="383806" y="1628473"/>
-            <a:ext cx="11029615" cy="4443824"/>
+            <a:off x="243735" y="1941010"/>
+            <a:ext cx="11476317" cy="4443824"/>
           </a:xfrm>
         </p:spPr>
         <p:txBody>
           <a:bodyPr>
-            <a:normAutofit/>
+            <a:normAutofit lnSpcReduction="10000"/>
           </a:bodyPr>
           <a:lstStyle/>
           <a:p>
@@ -12130,7 +12131,7 @@
                 <a:ea typeface="Aptos" panose="020B0004020202020204" pitchFamily="34" charset="0"/>
                 <a:sym typeface="Wingdings" panose="05000000000000000000" pitchFamily="2" charset="2"/>
               </a:rPr>
-              <a:t>TensorFlow</a:t>
+              <a:t>VGG16</a:t>
             </a:r>
           </a:p>
           <a:p>
@@ -12141,6 +12142,7 @@
             <a:r>
               <a:rPr lang="en-US" sz="2400" dirty="0">
                 <a:latin typeface="Gill Sans MT (Body)"/>
+                <a:ea typeface="Aptos" panose="020B0004020202020204" pitchFamily="34" charset="0"/>
                 <a:sym typeface="Wingdings" panose="05000000000000000000" pitchFamily="2" charset="2"/>
               </a:rPr>
               <a:t>It </a:t>
@@ -12149,7 +12151,7 @@
               <a:rPr lang="en-US" sz="2400" dirty="0">
                 <a:latin typeface="Gill Sans MT (Body)"/>
               </a:rPr>
-              <a:t>is an open-source machine learning framework developed by Google.</a:t>
+              <a:t>is a convolutional neural network (CNN) architecture that was proposed by the Visual Geometry Group (VGG) at the University of Oxford.</a:t>
             </a:r>
           </a:p>
           <a:p>
@@ -12161,7 +12163,23 @@
               <a:rPr lang="en-US" sz="2400" dirty="0">
                 <a:latin typeface="Gill Sans MT (Body)"/>
               </a:rPr>
-              <a:t>It's widely used for building and deploying machine learning models, particularly deep learning models.</a:t>
+              <a:t>It is one of the most well-known deep learning models for image classification.</a:t>
+            </a:r>
+          </a:p>
+          <a:p>
+            <a:pPr lvl="2" algn="just"/>
+            <a:endParaRPr lang="en-US" sz="2400" dirty="0">
+              <a:latin typeface="Gill Sans MT (Body)"/>
+              <a:sym typeface="Wingdings" panose="05000000000000000000" pitchFamily="2" charset="2"/>
+            </a:endParaRPr>
+          </a:p>
+          <a:p>
+            <a:pPr lvl="1" algn="just"/>
+            <a:r>
+              <a:rPr lang="en-US" sz="2800" dirty="0">
+                <a:latin typeface="Gill Sans MT (Body)"/>
+              </a:rPr>
+              <a:t>GlobalMaxPooling2D</a:t>
             </a:r>
           </a:p>
           <a:p>
@@ -12169,18 +12187,11 @@
               <a:buFont typeface="Wingdings" panose="05000000000000000000" pitchFamily="2" charset="2"/>
               <a:buChar char="Ø"/>
             </a:pPr>
-            <a:endParaRPr lang="en-US" sz="2400" dirty="0">
-              <a:latin typeface="Gill Sans MT (Body)"/>
-            </a:endParaRPr>
-          </a:p>
-          <a:p>
-            <a:pPr lvl="1" algn="just"/>
-            <a:r>
-              <a:rPr lang="en-US" sz="2800" dirty="0">
+            <a:r>
+              <a:rPr lang="en-US" sz="2400" dirty="0">
                 <a:latin typeface="Gill Sans MT (Body)"/>
-                <a:sym typeface="Wingdings" panose="05000000000000000000" pitchFamily="2" charset="2"/>
-              </a:rPr>
-              <a:t>Keras</a:t>
+              </a:rPr>
+              <a:t>It is a pooling operation commonly used in convolutional neural networks.</a:t>
             </a:r>
           </a:p>
           <a:p>
@@ -12191,27 +12202,16 @@
             <a:r>
               <a:rPr lang="en-US" sz="2400" dirty="0">
                 <a:latin typeface="Gill Sans MT (Body)"/>
-                <a:sym typeface="Wingdings" panose="05000000000000000000" pitchFamily="2" charset="2"/>
-              </a:rPr>
-              <a:t>It </a:t>
-            </a:r>
-            <a:r>
-              <a:rPr lang="en-US" sz="2400" dirty="0">
-                <a:latin typeface="Gill Sans MT (Body)"/>
-              </a:rPr>
-              <a:t>is a high-level neural networks API, written in Python and capable of running on top of TensorFlow.</a:t>
-            </a:r>
-            <a:endParaRPr lang="en-US" sz="2400" dirty="0">
-              <a:latin typeface="Gill Sans MT (Body)"/>
-              <a:sym typeface="Wingdings" panose="05000000000000000000" pitchFamily="2" charset="2"/>
-            </a:endParaRPr>
+              </a:rPr>
+              <a:t>It reduces the spatial dimensions (height and width) of the input while retaining the most important features.</a:t>
+            </a:r>
           </a:p>
         </p:txBody>
       </p:sp>
     </p:spTree>
     <p:extLst>
       <p:ext uri="{BB962C8B-B14F-4D97-AF65-F5344CB8AC3E}">
-        <p14:creationId xmlns:p14="http://schemas.microsoft.com/office/powerpoint/2010/main" val="3918595332"/>
+        <p14:creationId xmlns:p14="http://schemas.microsoft.com/office/powerpoint/2010/main" val="3465300825"/>
       </p:ext>
     </p:extLst>
   </p:cSld>
@@ -13081,12 +13081,23 @@
 </file>
 
 <file path=customXml/item1.xml><?xml version="1.0" encoding="utf-8"?>
-<?mso-contentType ?>
-<FormTemplates xmlns="http://schemas.microsoft.com/sharepoint/v3/contenttype/forms">
-  <Display>DocumentLibraryForm</Display>
-  <Edit>DocumentLibraryForm</Edit>
-  <New>DocumentLibraryForm</New>
-</FormTemplates>
+<p:properties xmlns:p="http://schemas.microsoft.com/office/2006/metadata/properties" xmlns:xsi="http://www.w3.org/2001/XMLSchema-instance" xmlns:pc="http://schemas.microsoft.com/office/infopath/2007/PartnerControls">
+  <documentManagement>
+    <_ip_UnifiedCompliancePolicyUIAction xmlns="http://schemas.microsoft.com/sharepoint/v3" xsi:nil="true"/>
+    <Image xmlns="71af3243-3dd4-4a8d-8c0d-dd76da1f02a5">
+      <Url xsi:nil="true"/>
+      <Description xsi:nil="true"/>
+    </Image>
+    <Status xmlns="71af3243-3dd4-4a8d-8c0d-dd76da1f02a5">Not started</Status>
+    <Background xmlns="71af3243-3dd4-4a8d-8c0d-dd76da1f02a5">false</Background>
+    <_ip_UnifiedCompliancePolicyProperties xmlns="http://schemas.microsoft.com/sharepoint/v3" xsi:nil="true"/>
+    <ImageTagsTaxHTField xmlns="71af3243-3dd4-4a8d-8c0d-dd76da1f02a5">
+      <Terms xmlns="http://schemas.microsoft.com/office/infopath/2007/PartnerControls"/>
+    </ImageTagsTaxHTField>
+    <TaxCatchAll xmlns="230e9df3-be65-4c73-a93b-d1236ebd677e" xsi:nil="true"/>
+    <MediaServiceKeyPoints xmlns="71af3243-3dd4-4a8d-8c0d-dd76da1f02a5" xsi:nil="true"/>
+  </documentManagement>
+</p:properties>
 </file>
 
 <file path=customXml/item2.xml><?xml version="1.0" encoding="utf-8"?>
@@ -13396,29 +13407,22 @@
 </file>
 
 <file path=customXml/item3.xml><?xml version="1.0" encoding="utf-8"?>
-<p:properties xmlns:p="http://schemas.microsoft.com/office/2006/metadata/properties" xmlns:xsi="http://www.w3.org/2001/XMLSchema-instance" xmlns:pc="http://schemas.microsoft.com/office/infopath/2007/PartnerControls">
-  <documentManagement>
-    <_ip_UnifiedCompliancePolicyUIAction xmlns="http://schemas.microsoft.com/sharepoint/v3" xsi:nil="true"/>
-    <Image xmlns="71af3243-3dd4-4a8d-8c0d-dd76da1f02a5">
-      <Url xsi:nil="true"/>
-      <Description xsi:nil="true"/>
-    </Image>
-    <Status xmlns="71af3243-3dd4-4a8d-8c0d-dd76da1f02a5">Not started</Status>
-    <Background xmlns="71af3243-3dd4-4a8d-8c0d-dd76da1f02a5">false</Background>
-    <_ip_UnifiedCompliancePolicyProperties xmlns="http://schemas.microsoft.com/sharepoint/v3" xsi:nil="true"/>
-    <ImageTagsTaxHTField xmlns="71af3243-3dd4-4a8d-8c0d-dd76da1f02a5">
-      <Terms xmlns="http://schemas.microsoft.com/office/infopath/2007/PartnerControls"/>
-    </ImageTagsTaxHTField>
-    <TaxCatchAll xmlns="230e9df3-be65-4c73-a93b-d1236ebd677e" xsi:nil="true"/>
-    <MediaServiceKeyPoints xmlns="71af3243-3dd4-4a8d-8c0d-dd76da1f02a5" xsi:nil="true"/>
-  </documentManagement>
-</p:properties>
+<?mso-contentType ?>
+<FormTemplates xmlns="http://schemas.microsoft.com/sharepoint/v3/contenttype/forms">
+  <Display>DocumentLibraryForm</Display>
+  <Edit>DocumentLibraryForm</Edit>
+  <New>DocumentLibraryForm</New>
+</FormTemplates>
 </file>
 
 <file path=customXml/itemProps1.xml><?xml version="1.0" encoding="utf-8"?>
-<ds:datastoreItem xmlns:ds="http://schemas.openxmlformats.org/officeDocument/2006/customXml" ds:itemID="{342D3C2F-55A5-48C0-9D5A-95C7FF0389D0}">
+<ds:datastoreItem xmlns:ds="http://schemas.openxmlformats.org/officeDocument/2006/customXml" ds:itemID="{3791575F-4C21-47C4-8D13-EB9BE66B536F}">
   <ds:schemaRefs>
-    <ds:schemaRef ds:uri="http://schemas.microsoft.com/sharepoint/v3/contenttype/forms"/>
+    <ds:schemaRef ds:uri="http://schemas.microsoft.com/office/2006/metadata/properties"/>
+    <ds:schemaRef ds:uri="http://schemas.microsoft.com/office/infopath/2007/PartnerControls"/>
+    <ds:schemaRef ds:uri="http://schemas.microsoft.com/sharepoint/v3"/>
+    <ds:schemaRef ds:uri="71af3243-3dd4-4a8d-8c0d-dd76da1f02a5"/>
+    <ds:schemaRef ds:uri="230e9df3-be65-4c73-a93b-d1236ebd677e"/>
   </ds:schemaRefs>
 </ds:datastoreItem>
 </file>
@@ -13445,13 +13449,9 @@
 </file>
 
 <file path=customXml/itemProps3.xml><?xml version="1.0" encoding="utf-8"?>
-<ds:datastoreItem xmlns:ds="http://schemas.openxmlformats.org/officeDocument/2006/customXml" ds:itemID="{3791575F-4C21-47C4-8D13-EB9BE66B536F}">
+<ds:datastoreItem xmlns:ds="http://schemas.openxmlformats.org/officeDocument/2006/customXml" ds:itemID="{342D3C2F-55A5-48C0-9D5A-95C7FF0389D0}">
   <ds:schemaRefs>
-    <ds:schemaRef ds:uri="http://schemas.microsoft.com/office/2006/metadata/properties"/>
-    <ds:schemaRef ds:uri="http://schemas.microsoft.com/office/infopath/2007/PartnerControls"/>
-    <ds:schemaRef ds:uri="http://schemas.microsoft.com/sharepoint/v3"/>
-    <ds:schemaRef ds:uri="71af3243-3dd4-4a8d-8c0d-dd76da1f02a5"/>
-    <ds:schemaRef ds:uri="230e9df3-be65-4c73-a93b-d1236ebd677e"/>
+    <ds:schemaRef ds:uri="http://schemas.microsoft.com/sharepoint/v3/contenttype/forms"/>
   </ds:schemaRefs>
 </ds:datastoreItem>
 </file>
</xml_diff>